<commit_message>
Now with YML config!
</commit_message>
<xml_diff>
--- a/pics/Screenshots.pptx
+++ b/pics/Screenshots.pptx
@@ -7,8 +7,8 @@
   <p:sldIdLst>
     <p:sldId id="256" r:id="rId2"/>
     <p:sldId id="257" r:id="rId3"/>
-    <p:sldId id="259" r:id="rId4"/>
-    <p:sldId id="258" r:id="rId5"/>
+    <p:sldId id="258" r:id="rId4"/>
+    <p:sldId id="259" r:id="rId5"/>
   </p:sldIdLst>
   <p:sldSz cx="9144000" cy="6858000" type="screen4x3"/>
   <p:notesSz cx="6858000" cy="9144000"/>
@@ -291,7 +291,7 @@
           <a:p>
             <a:fld id="{558CB78A-85EC-4CA9-8004-D1035A008D0A}" type="datetimeFigureOut">
               <a:rPr lang="en-US" smtClean="0"/>
-              <a:t>1/6/2012</a:t>
+              <a:t>1/14/2012</a:t>
             </a:fld>
             <a:endParaRPr lang="en-US"/>
           </a:p>
@@ -461,7 +461,7 @@
           <a:p>
             <a:fld id="{558CB78A-85EC-4CA9-8004-D1035A008D0A}" type="datetimeFigureOut">
               <a:rPr lang="en-US" smtClean="0"/>
-              <a:t>1/6/2012</a:t>
+              <a:t>1/14/2012</a:t>
             </a:fld>
             <a:endParaRPr lang="en-US"/>
           </a:p>
@@ -641,7 +641,7 @@
           <a:p>
             <a:fld id="{558CB78A-85EC-4CA9-8004-D1035A008D0A}" type="datetimeFigureOut">
               <a:rPr lang="en-US" smtClean="0"/>
-              <a:t>1/6/2012</a:t>
+              <a:t>1/14/2012</a:t>
             </a:fld>
             <a:endParaRPr lang="en-US"/>
           </a:p>
@@ -811,7 +811,7 @@
           <a:p>
             <a:fld id="{558CB78A-85EC-4CA9-8004-D1035A008D0A}" type="datetimeFigureOut">
               <a:rPr lang="en-US" smtClean="0"/>
-              <a:t>1/6/2012</a:t>
+              <a:t>1/14/2012</a:t>
             </a:fld>
             <a:endParaRPr lang="en-US"/>
           </a:p>
@@ -1057,7 +1057,7 @@
           <a:p>
             <a:fld id="{558CB78A-85EC-4CA9-8004-D1035A008D0A}" type="datetimeFigureOut">
               <a:rPr lang="en-US" smtClean="0"/>
-              <a:t>1/6/2012</a:t>
+              <a:t>1/14/2012</a:t>
             </a:fld>
             <a:endParaRPr lang="en-US"/>
           </a:p>
@@ -1345,7 +1345,7 @@
           <a:p>
             <a:fld id="{558CB78A-85EC-4CA9-8004-D1035A008D0A}" type="datetimeFigureOut">
               <a:rPr lang="en-US" smtClean="0"/>
-              <a:t>1/6/2012</a:t>
+              <a:t>1/14/2012</a:t>
             </a:fld>
             <a:endParaRPr lang="en-US"/>
           </a:p>
@@ -1767,7 +1767,7 @@
           <a:p>
             <a:fld id="{558CB78A-85EC-4CA9-8004-D1035A008D0A}" type="datetimeFigureOut">
               <a:rPr lang="en-US" smtClean="0"/>
-              <a:t>1/6/2012</a:t>
+              <a:t>1/14/2012</a:t>
             </a:fld>
             <a:endParaRPr lang="en-US"/>
           </a:p>
@@ -1885,7 +1885,7 @@
           <a:p>
             <a:fld id="{558CB78A-85EC-4CA9-8004-D1035A008D0A}" type="datetimeFigureOut">
               <a:rPr lang="en-US" smtClean="0"/>
-              <a:t>1/6/2012</a:t>
+              <a:t>1/14/2012</a:t>
             </a:fld>
             <a:endParaRPr lang="en-US"/>
           </a:p>
@@ -1980,7 +1980,7 @@
           <a:p>
             <a:fld id="{558CB78A-85EC-4CA9-8004-D1035A008D0A}" type="datetimeFigureOut">
               <a:rPr lang="en-US" smtClean="0"/>
-              <a:t>1/6/2012</a:t>
+              <a:t>1/14/2012</a:t>
             </a:fld>
             <a:endParaRPr lang="en-US"/>
           </a:p>
@@ -2257,7 +2257,7 @@
           <a:p>
             <a:fld id="{558CB78A-85EC-4CA9-8004-D1035A008D0A}" type="datetimeFigureOut">
               <a:rPr lang="en-US" smtClean="0"/>
-              <a:t>1/6/2012</a:t>
+              <a:t>1/14/2012</a:t>
             </a:fld>
             <a:endParaRPr lang="en-US"/>
           </a:p>
@@ -2510,7 +2510,7 @@
           <a:p>
             <a:fld id="{558CB78A-85EC-4CA9-8004-D1035A008D0A}" type="datetimeFigureOut">
               <a:rPr lang="en-US" smtClean="0"/>
-              <a:t>1/6/2012</a:t>
+              <a:t>1/14/2012</a:t>
             </a:fld>
             <a:endParaRPr lang="en-US"/>
           </a:p>
@@ -2723,7 +2723,7 @@
           <a:p>
             <a:fld id="{558CB78A-85EC-4CA9-8004-D1035A008D0A}" type="datetimeFigureOut">
               <a:rPr lang="en-US" smtClean="0"/>
-              <a:t>1/6/2012</a:t>
+              <a:t>1/14/2012</a:t>
             </a:fld>
             <a:endParaRPr lang="en-US"/>
           </a:p>
@@ -3100,16 +3100,16 @@
       </p:grpSpPr>
       <p:grpSp>
         <p:nvGrpSpPr>
-          <p:cNvPr id="6" name="Group 5"/>
+          <p:cNvPr id="2" name="Group 1"/>
           <p:cNvGrpSpPr/>
           <p:nvPr/>
         </p:nvGrpSpPr>
         <p:grpSpPr>
           <a:xfrm>
-            <a:off x="114968" y="251458"/>
-            <a:ext cx="5754588" cy="6054101"/>
-            <a:chOff x="114968" y="251458"/>
-            <a:chExt cx="5754588" cy="6054101"/>
+            <a:off x="113426" y="251458"/>
+            <a:ext cx="5756130" cy="7572243"/>
+            <a:chOff x="113426" y="251458"/>
+            <a:chExt cx="5756130" cy="7572243"/>
           </a:xfrm>
         </p:grpSpPr>
         <p:pic>
@@ -3121,10 +3121,10 @@
             <p:nvPr/>
           </p:nvPicPr>
           <p:blipFill>
-            <a:blip r:embed="rId2">
+            <a:blip r:embed="rId2" cstate="screen">
               <a:extLst>
                 <a:ext uri="{28A0092B-C50C-407E-A947-70E740481C1C}">
-                  <a14:useLocalDpi xmlns:a14="http://schemas.microsoft.com/office/drawing/2010/main" val="0"/>
+                  <a14:useLocalDpi xmlns:a14="http://schemas.microsoft.com/office/drawing/2010/main"/>
                 </a:ext>
               </a:extLst>
             </a:blip>
@@ -3167,10 +3167,10 @@
             <p:nvPr/>
           </p:nvPicPr>
           <p:blipFill>
-            <a:blip r:embed="rId3">
+            <a:blip r:embed="rId3" cstate="screen">
               <a:extLst>
                 <a:ext uri="{28A0092B-C50C-407E-A947-70E740481C1C}">
-                  <a14:useLocalDpi xmlns:a14="http://schemas.microsoft.com/office/drawing/2010/main" val="0"/>
+                  <a14:useLocalDpi xmlns:a14="http://schemas.microsoft.com/office/drawing/2010/main"/>
                 </a:ext>
               </a:extLst>
             </a:blip>
@@ -3213,10 +3213,10 @@
             <p:nvPr/>
           </p:nvPicPr>
           <p:blipFill>
-            <a:blip r:embed="rId4">
+            <a:blip r:embed="rId4" cstate="screen">
               <a:extLst>
                 <a:ext uri="{28A0092B-C50C-407E-A947-70E740481C1C}">
-                  <a14:useLocalDpi xmlns:a14="http://schemas.microsoft.com/office/drawing/2010/main" val="0"/>
+                  <a14:useLocalDpi xmlns:a14="http://schemas.microsoft.com/office/drawing/2010/main"/>
                 </a:ext>
               </a:extLst>
             </a:blip>
@@ -3259,10 +3259,10 @@
             <p:nvPr/>
           </p:nvPicPr>
           <p:blipFill>
-            <a:blip r:embed="rId5">
+            <a:blip r:embed="rId5" cstate="screen">
               <a:extLst>
                 <a:ext uri="{28A0092B-C50C-407E-A947-70E740481C1C}">
-                  <a14:useLocalDpi xmlns:a14="http://schemas.microsoft.com/office/drawing/2010/main" val="0"/>
+                  <a14:useLocalDpi xmlns:a14="http://schemas.microsoft.com/office/drawing/2010/main"/>
                 </a:ext>
               </a:extLst>
             </a:blip>
@@ -3305,10 +3305,10 @@
             <p:nvPr/>
           </p:nvPicPr>
           <p:blipFill>
-            <a:blip r:embed="rId6">
+            <a:blip r:embed="rId6" cstate="screen">
               <a:extLst>
                 <a:ext uri="{28A0092B-C50C-407E-A947-70E740481C1C}">
-                  <a14:useLocalDpi xmlns:a14="http://schemas.microsoft.com/office/drawing/2010/main" val="0"/>
+                  <a14:useLocalDpi xmlns:a14="http://schemas.microsoft.com/office/drawing/2010/main"/>
                 </a:ext>
               </a:extLst>
             </a:blip>
@@ -3351,10 +3351,10 @@
             <p:nvPr/>
           </p:nvPicPr>
           <p:blipFill>
-            <a:blip r:embed="rId7">
+            <a:blip r:embed="rId7" cstate="screen">
               <a:extLst>
                 <a:ext uri="{28A0092B-C50C-407E-A947-70E740481C1C}">
-                  <a14:useLocalDpi xmlns:a14="http://schemas.microsoft.com/office/drawing/2010/main" val="0"/>
+                  <a14:useLocalDpi xmlns:a14="http://schemas.microsoft.com/office/drawing/2010/main"/>
                 </a:ext>
               </a:extLst>
             </a:blip>
@@ -3397,10 +3397,10 @@
             <p:nvPr/>
           </p:nvPicPr>
           <p:blipFill>
-            <a:blip r:embed="rId8">
+            <a:blip r:embed="rId8" cstate="screen">
               <a:extLst>
                 <a:ext uri="{28A0092B-C50C-407E-A947-70E740481C1C}">
-                  <a14:useLocalDpi xmlns:a14="http://schemas.microsoft.com/office/drawing/2010/main" val="0"/>
+                  <a14:useLocalDpi xmlns:a14="http://schemas.microsoft.com/office/drawing/2010/main"/>
                 </a:ext>
               </a:extLst>
             </a:blip>
@@ -3443,10 +3443,10 @@
             <p:nvPr/>
           </p:nvPicPr>
           <p:blipFill>
-            <a:blip r:embed="rId9">
+            <a:blip r:embed="rId9" cstate="screen">
               <a:extLst>
                 <a:ext uri="{28A0092B-C50C-407E-A947-70E740481C1C}">
-                  <a14:useLocalDpi xmlns:a14="http://schemas.microsoft.com/office/drawing/2010/main" val="0"/>
+                  <a14:useLocalDpi xmlns:a14="http://schemas.microsoft.com/office/drawing/2010/main"/>
                 </a:ext>
               </a:extLst>
             </a:blip>
@@ -3459,6 +3459,52 @@
             <a:xfrm>
               <a:off x="2999882" y="3286129"/>
               <a:ext cx="2869674" cy="1502095"/>
+            </a:xfrm>
+            <a:prstGeom prst="rect">
+              <a:avLst/>
+            </a:prstGeom>
+            <a:noFill/>
+            <a:ln>
+              <a:solidFill>
+                <a:schemeClr val="bg1"/>
+              </a:solidFill>
+            </a:ln>
+            <a:extLst>
+              <a:ext uri="{909E8E84-426E-40DD-AFC4-6F175D3DCCD1}">
+                <a14:hiddenFill xmlns:a14="http://schemas.microsoft.com/office/drawing/2010/main">
+                  <a:solidFill>
+                    <a:srgbClr val="FFFFFF"/>
+                  </a:solidFill>
+                </a14:hiddenFill>
+              </a:ext>
+            </a:extLst>
+          </p:spPr>
+        </p:pic>
+        <p:pic>
+          <p:nvPicPr>
+            <p:cNvPr id="12" name="Picture 11" descr="C:\Users\Eddie\AppData\Roaming\.minecraft\screenshots\2012-01-09_21.52.52.png"/>
+            <p:cNvPicPr>
+              <a:picLocks noChangeAspect="1" noChangeArrowheads="1"/>
+            </p:cNvPicPr>
+            <p:nvPr/>
+          </p:nvPicPr>
+          <p:blipFill>
+            <a:blip r:embed="rId10" cstate="screen">
+              <a:extLst>
+                <a:ext uri="{28A0092B-C50C-407E-A947-70E740481C1C}">
+                  <a14:useLocalDpi xmlns:a14="http://schemas.microsoft.com/office/drawing/2010/main"/>
+                </a:ext>
+              </a:extLst>
+            </a:blip>
+            <a:srcRect/>
+            <a:stretch>
+              <a:fillRect/>
+            </a:stretch>
+          </p:blipFill>
+          <p:spPr bwMode="auto">
+            <a:xfrm>
+              <a:off x="113426" y="6320799"/>
+              <a:ext cx="2871216" cy="1502902"/>
             </a:xfrm>
             <a:prstGeom prst="rect">
               <a:avLst/>
@@ -3534,10 +3580,10 @@
             <p:nvPr/>
           </p:nvPicPr>
           <p:blipFill>
-            <a:blip r:embed="rId2">
+            <a:blip r:embed="rId2" cstate="screen">
               <a:extLst>
                 <a:ext uri="{28A0092B-C50C-407E-A947-70E740481C1C}">
-                  <a14:useLocalDpi xmlns:a14="http://schemas.microsoft.com/office/drawing/2010/main" val="0"/>
+                  <a14:useLocalDpi xmlns:a14="http://schemas.microsoft.com/office/drawing/2010/main"/>
                 </a:ext>
               </a:extLst>
             </a:blip>
@@ -3580,10 +3626,10 @@
             <p:nvPr/>
           </p:nvPicPr>
           <p:blipFill>
-            <a:blip r:embed="rId3">
+            <a:blip r:embed="rId3" cstate="screen">
               <a:extLst>
                 <a:ext uri="{28A0092B-C50C-407E-A947-70E740481C1C}">
-                  <a14:useLocalDpi xmlns:a14="http://schemas.microsoft.com/office/drawing/2010/main" val="0"/>
+                  <a14:useLocalDpi xmlns:a14="http://schemas.microsoft.com/office/drawing/2010/main"/>
                 </a:ext>
               </a:extLst>
             </a:blip>
@@ -3626,10 +3672,10 @@
             <p:nvPr/>
           </p:nvPicPr>
           <p:blipFill>
-            <a:blip r:embed="rId4">
+            <a:blip r:embed="rId4" cstate="screen">
               <a:extLst>
                 <a:ext uri="{28A0092B-C50C-407E-A947-70E740481C1C}">
-                  <a14:useLocalDpi xmlns:a14="http://schemas.microsoft.com/office/drawing/2010/main" val="0"/>
+                  <a14:useLocalDpi xmlns:a14="http://schemas.microsoft.com/office/drawing/2010/main"/>
                 </a:ext>
               </a:extLst>
             </a:blip>
@@ -3672,10 +3718,10 @@
             <p:nvPr/>
           </p:nvPicPr>
           <p:blipFill>
-            <a:blip r:embed="rId5">
+            <a:blip r:embed="rId5" cstate="screen">
               <a:extLst>
                 <a:ext uri="{28A0092B-C50C-407E-A947-70E740481C1C}">
-                  <a14:useLocalDpi xmlns:a14="http://schemas.microsoft.com/office/drawing/2010/main" val="0"/>
+                  <a14:useLocalDpi xmlns:a14="http://schemas.microsoft.com/office/drawing/2010/main"/>
                 </a:ext>
               </a:extLst>
             </a:blip>
@@ -3718,10 +3764,10 @@
             <p:nvPr/>
           </p:nvPicPr>
           <p:blipFill>
-            <a:blip r:embed="rId6">
+            <a:blip r:embed="rId6" cstate="screen">
               <a:extLst>
                 <a:ext uri="{28A0092B-C50C-407E-A947-70E740481C1C}">
-                  <a14:useLocalDpi xmlns:a14="http://schemas.microsoft.com/office/drawing/2010/main" val="0"/>
+                  <a14:useLocalDpi xmlns:a14="http://schemas.microsoft.com/office/drawing/2010/main"/>
                 </a:ext>
               </a:extLst>
             </a:blip>
@@ -3764,10 +3810,10 @@
             <p:nvPr/>
           </p:nvPicPr>
           <p:blipFill>
-            <a:blip r:embed="rId7">
+            <a:blip r:embed="rId7" cstate="screen">
               <a:extLst>
                 <a:ext uri="{28A0092B-C50C-407E-A947-70E740481C1C}">
-                  <a14:useLocalDpi xmlns:a14="http://schemas.microsoft.com/office/drawing/2010/main" val="0"/>
+                  <a14:useLocalDpi xmlns:a14="http://schemas.microsoft.com/office/drawing/2010/main"/>
                 </a:ext>
               </a:extLst>
             </a:blip>
@@ -3811,10 +3857,10 @@
           <p:nvPr/>
         </p:nvPicPr>
         <p:blipFill>
-          <a:blip r:embed="rId8">
+          <a:blip r:embed="rId8" cstate="screen">
             <a:extLst>
               <a:ext uri="{28A0092B-C50C-407E-A947-70E740481C1C}">
-                <a14:useLocalDpi xmlns:a14="http://schemas.microsoft.com/office/drawing/2010/main" val="0"/>
+                <a14:useLocalDpi xmlns:a14="http://schemas.microsoft.com/office/drawing/2010/main"/>
               </a:ext>
             </a:extLst>
           </a:blip>
@@ -3873,6 +3919,143 @@
           <a:chExt cx="0" cy="0"/>
         </a:xfrm>
       </p:grpSpPr>
+      <p:grpSp>
+        <p:nvGrpSpPr>
+          <p:cNvPr id="5" name="Group 4"/>
+          <p:cNvGrpSpPr/>
+          <p:nvPr/>
+        </p:nvGrpSpPr>
+        <p:grpSpPr>
+          <a:xfrm>
+            <a:off x="228092" y="136525"/>
+            <a:ext cx="5767832" cy="1502902"/>
+            <a:chOff x="228092" y="136525"/>
+            <a:chExt cx="5767832" cy="1502902"/>
+          </a:xfrm>
+        </p:grpSpPr>
+        <p:pic>
+          <p:nvPicPr>
+            <p:cNvPr id="3" name="Picture 2" descr="C:\Users\Eddie\AppData\Roaming\.minecraft\screenshots\2012-01-14_22.28.36.png"/>
+            <p:cNvPicPr>
+              <a:picLocks noChangeAspect="1" noChangeArrowheads="1"/>
+            </p:cNvPicPr>
+            <p:nvPr/>
+          </p:nvPicPr>
+          <p:blipFill>
+            <a:blip r:embed="rId2" cstate="screen">
+              <a:extLst>
+                <a:ext uri="{28A0092B-C50C-407E-A947-70E740481C1C}">
+                  <a14:useLocalDpi xmlns:a14="http://schemas.microsoft.com/office/drawing/2010/main"/>
+                </a:ext>
+              </a:extLst>
+            </a:blip>
+            <a:srcRect/>
+            <a:stretch>
+              <a:fillRect/>
+            </a:stretch>
+          </p:blipFill>
+          <p:spPr bwMode="auto">
+            <a:xfrm>
+              <a:off x="228092" y="136525"/>
+              <a:ext cx="2871216" cy="1502902"/>
+            </a:xfrm>
+            <a:prstGeom prst="rect">
+              <a:avLst/>
+            </a:prstGeom>
+            <a:noFill/>
+            <a:ln>
+              <a:solidFill>
+                <a:schemeClr val="bg1"/>
+              </a:solidFill>
+            </a:ln>
+            <a:extLst>
+              <a:ext uri="{909E8E84-426E-40DD-AFC4-6F175D3DCCD1}">
+                <a14:hiddenFill xmlns:a14="http://schemas.microsoft.com/office/drawing/2010/main">
+                  <a:solidFill>
+                    <a:srgbClr val="FFFFFF"/>
+                  </a:solidFill>
+                </a14:hiddenFill>
+              </a:ext>
+            </a:extLst>
+          </p:spPr>
+        </p:pic>
+        <p:pic>
+          <p:nvPicPr>
+            <p:cNvPr id="1028" name="Picture 4" descr="C:\Users\Eddie\AppData\Roaming\.minecraft\screenshots\2012-01-14_22.33.58.png"/>
+            <p:cNvPicPr>
+              <a:picLocks noChangeAspect="1" noChangeArrowheads="1"/>
+            </p:cNvPicPr>
+            <p:nvPr/>
+          </p:nvPicPr>
+          <p:blipFill>
+            <a:blip r:embed="rId3" cstate="screen">
+              <a:extLst>
+                <a:ext uri="{28A0092B-C50C-407E-A947-70E740481C1C}">
+                  <a14:useLocalDpi xmlns:a14="http://schemas.microsoft.com/office/drawing/2010/main"/>
+                </a:ext>
+              </a:extLst>
+            </a:blip>
+            <a:srcRect/>
+            <a:stretch>
+              <a:fillRect/>
+            </a:stretch>
+          </p:blipFill>
+          <p:spPr bwMode="auto">
+            <a:xfrm>
+              <a:off x="3124708" y="136525"/>
+              <a:ext cx="2871216" cy="1502902"/>
+            </a:xfrm>
+            <a:prstGeom prst="rect">
+              <a:avLst/>
+            </a:prstGeom>
+            <a:noFill/>
+            <a:ln>
+              <a:solidFill>
+                <a:schemeClr val="bg1"/>
+              </a:solidFill>
+            </a:ln>
+            <a:extLst>
+              <a:ext uri="{909E8E84-426E-40DD-AFC4-6F175D3DCCD1}">
+                <a14:hiddenFill xmlns:a14="http://schemas.microsoft.com/office/drawing/2010/main">
+                  <a:solidFill>
+                    <a:srgbClr val="FFFFFF"/>
+                  </a:solidFill>
+                </a14:hiddenFill>
+              </a:ext>
+            </a:extLst>
+          </p:spPr>
+        </p:pic>
+      </p:grpSp>
+    </p:spTree>
+    <p:extLst>
+      <p:ext uri="{BB962C8B-B14F-4D97-AF65-F5344CB8AC3E}">
+        <p14:creationId xmlns:p14="http://schemas.microsoft.com/office/powerpoint/2010/main" val="1305965027"/>
+      </p:ext>
+    </p:extLst>
+  </p:cSld>
+  <p:clrMapOvr>
+    <a:masterClrMapping/>
+  </p:clrMapOvr>
+</p:sld>
+</file>
+
+<file path=ppt/slides/slide4.xml><?xml version="1.0" encoding="utf-8"?>
+<p:sld xmlns:a="http://schemas.openxmlformats.org/drawingml/2006/main" xmlns:r="http://schemas.openxmlformats.org/officeDocument/2006/relationships" xmlns:p="http://schemas.openxmlformats.org/presentationml/2006/main">
+  <p:cSld>
+    <p:spTree>
+      <p:nvGrpSpPr>
+        <p:cNvPr id="1" name=""/>
+        <p:cNvGrpSpPr/>
+        <p:nvPr/>
+      </p:nvGrpSpPr>
+      <p:grpSpPr>
+        <a:xfrm>
+          <a:off x="0" y="0"/>
+          <a:ext cx="0" cy="0"/>
+          <a:chOff x="0" y="0"/>
+          <a:chExt cx="0" cy="0"/>
+        </a:xfrm>
+      </p:grpSpPr>
       <p:pic>
         <p:nvPicPr>
           <p:cNvPr id="2050" name="Picture 2" descr="C:\Users\Eddie\git\WellWorld\pics\Watch where you walk.jpg"/>
@@ -3882,10 +4065,10 @@
           <p:nvPr/>
         </p:nvPicPr>
         <p:blipFill>
-          <a:blip r:embed="rId2">
+          <a:blip r:embed="rId2" cstate="screen">
             <a:extLst>
               <a:ext uri="{28A0092B-C50C-407E-A947-70E740481C1C}">
-                <a14:useLocalDpi xmlns:a14="http://schemas.microsoft.com/office/drawing/2010/main" val="0"/>
+                <a14:useLocalDpi xmlns:a14="http://schemas.microsoft.com/office/drawing/2010/main"/>
               </a:ext>
             </a:extLst>
           </a:blip>
@@ -3923,10 +4106,10 @@
           <p:nvPr/>
         </p:nvPicPr>
         <p:blipFill>
-          <a:blip r:embed="rId3">
+          <a:blip r:embed="rId3" cstate="screen">
             <a:extLst>
               <a:ext uri="{28A0092B-C50C-407E-A947-70E740481C1C}">
-                <a14:useLocalDpi xmlns:a14="http://schemas.microsoft.com/office/drawing/2010/main" val="0"/>
+                <a14:useLocalDpi xmlns:a14="http://schemas.microsoft.com/office/drawing/2010/main"/>
               </a:ext>
             </a:extLst>
           </a:blip>
@@ -3964,10 +4147,10 @@
           <p:nvPr/>
         </p:nvPicPr>
         <p:blipFill>
-          <a:blip r:embed="rId4">
+          <a:blip r:embed="rId4" cstate="screen">
             <a:extLst>
               <a:ext uri="{28A0092B-C50C-407E-A947-70E740481C1C}">
-                <a14:useLocalDpi xmlns:a14="http://schemas.microsoft.com/office/drawing/2010/main" val="0"/>
+                <a14:useLocalDpi xmlns:a14="http://schemas.microsoft.com/office/drawing/2010/main"/>
               </a:ext>
             </a:extLst>
           </a:blip>
@@ -4000,118 +4183,6 @@
     <p:extLst>
       <p:ext uri="{BB962C8B-B14F-4D97-AF65-F5344CB8AC3E}">
         <p14:creationId xmlns:p14="http://schemas.microsoft.com/office/powerpoint/2010/main" val="436334060"/>
-      </p:ext>
-    </p:extLst>
-  </p:cSld>
-  <p:clrMapOvr>
-    <a:masterClrMapping/>
-  </p:clrMapOvr>
-</p:sld>
-</file>
-
-<file path=ppt/slides/slide4.xml><?xml version="1.0" encoding="utf-8"?>
-<p:sld xmlns:a="http://schemas.openxmlformats.org/drawingml/2006/main" xmlns:r="http://schemas.openxmlformats.org/officeDocument/2006/relationships" xmlns:p="http://schemas.openxmlformats.org/presentationml/2006/main">
-  <p:cSld>
-    <p:spTree>
-      <p:nvGrpSpPr>
-        <p:cNvPr id="1" name=""/>
-        <p:cNvGrpSpPr/>
-        <p:nvPr/>
-      </p:nvGrpSpPr>
-      <p:grpSpPr>
-        <a:xfrm>
-          <a:off x="0" y="0"/>
-          <a:ext cx="0" cy="0"/>
-          <a:chOff x="0" y="0"/>
-          <a:chExt cx="0" cy="0"/>
-        </a:xfrm>
-      </p:grpSpPr>
-      <p:pic>
-        <p:nvPicPr>
-          <p:cNvPr id="1026" name="Picture 2" descr="C:\Users\Eddie\git\WellWorld\pics\2011-12-24_21.07.08.jpg"/>
-          <p:cNvPicPr>
-            <a:picLocks noChangeAspect="1" noChangeArrowheads="1"/>
-          </p:cNvPicPr>
-          <p:nvPr/>
-        </p:nvPicPr>
-        <p:blipFill>
-          <a:blip r:embed="rId2" cstate="print">
-            <a:extLst>
-              <a:ext uri="{28A0092B-C50C-407E-A947-70E740481C1C}">
-                <a14:useLocalDpi xmlns:a14="http://schemas.microsoft.com/office/drawing/2010/main" val="0"/>
-              </a:ext>
-            </a:extLst>
-          </a:blip>
-          <a:srcRect/>
-          <a:stretch>
-            <a:fillRect/>
-          </a:stretch>
-        </p:blipFill>
-        <p:spPr bwMode="auto">
-          <a:xfrm>
-            <a:off x="676275" y="912495"/>
-            <a:ext cx="2871216" cy="1502902"/>
-          </a:xfrm>
-          <a:prstGeom prst="rect">
-            <a:avLst/>
-          </a:prstGeom>
-          <a:noFill/>
-          <a:extLst>
-            <a:ext uri="{909E8E84-426E-40DD-AFC4-6F175D3DCCD1}">
-              <a14:hiddenFill xmlns:a14="http://schemas.microsoft.com/office/drawing/2010/main">
-                <a:solidFill>
-                  <a:srgbClr val="FFFFFF"/>
-                </a:solidFill>
-              </a14:hiddenFill>
-            </a:ext>
-          </a:extLst>
-        </p:spPr>
-      </p:pic>
-      <p:pic>
-        <p:nvPicPr>
-          <p:cNvPr id="1027" name="Picture 3" descr="C:\Users\Eddie\git\WellWorld\pics\2011-12-24_21.12.17.jpg"/>
-          <p:cNvPicPr>
-            <a:picLocks noChangeAspect="1" noChangeArrowheads="1"/>
-          </p:cNvPicPr>
-          <p:nvPr/>
-        </p:nvPicPr>
-        <p:blipFill>
-          <a:blip r:embed="rId3" cstate="print">
-            <a:extLst>
-              <a:ext uri="{28A0092B-C50C-407E-A947-70E740481C1C}">
-                <a14:useLocalDpi xmlns:a14="http://schemas.microsoft.com/office/drawing/2010/main" val="0"/>
-              </a:ext>
-            </a:extLst>
-          </a:blip>
-          <a:srcRect/>
-          <a:stretch>
-            <a:fillRect/>
-          </a:stretch>
-        </p:blipFill>
-        <p:spPr bwMode="auto">
-          <a:xfrm>
-            <a:off x="676275" y="2635250"/>
-            <a:ext cx="2871216" cy="1502902"/>
-          </a:xfrm>
-          <a:prstGeom prst="rect">
-            <a:avLst/>
-          </a:prstGeom>
-          <a:noFill/>
-          <a:extLst>
-            <a:ext uri="{909E8E84-426E-40DD-AFC4-6F175D3DCCD1}">
-              <a14:hiddenFill xmlns:a14="http://schemas.microsoft.com/office/drawing/2010/main">
-                <a:solidFill>
-                  <a:srgbClr val="FFFFFF"/>
-                </a:solidFill>
-              </a14:hiddenFill>
-            </a:ext>
-          </a:extLst>
-        </p:spPr>
-      </p:pic>
-    </p:spTree>
-    <p:extLst>
-      <p:ext uri="{BB962C8B-B14F-4D97-AF65-F5344CB8AC3E}">
-        <p14:creationId xmlns:p14="http://schemas.microsoft.com/office/powerpoint/2010/main" val="1305965027"/>
       </p:ext>
     </p:extLst>
   </p:cSld>

</xml_diff>